<commit_message>
first trial to correct modeling process section
</commit_message>
<xml_diff>
--- a/using/figures/modeling.pptx
+++ b/using/figures/modeling.pptx
@@ -289,7 +289,7 @@
             <a:fld id="{1D8BD707-D9CF-40AE-B4C6-C98DA3205C09}" type="datetimeFigureOut">
               <a:rPr lang="en-US" smtClean="0"/>
               <a:pPr/>
-              <a:t>9/6/2013</a:t>
+              <a:t>1/21/2015</a:t>
             </a:fld>
             <a:endParaRPr lang="en-US"/>
           </a:p>
@@ -456,7 +456,7 @@
             <a:fld id="{1D8BD707-D9CF-40AE-B4C6-C98DA3205C09}" type="datetimeFigureOut">
               <a:rPr lang="en-US" smtClean="0"/>
               <a:pPr/>
-              <a:t>9/6/2013</a:t>
+              <a:t>1/21/2015</a:t>
             </a:fld>
             <a:endParaRPr lang="en-US"/>
           </a:p>
@@ -633,7 +633,7 @@
             <a:fld id="{1D8BD707-D9CF-40AE-B4C6-C98DA3205C09}" type="datetimeFigureOut">
               <a:rPr lang="en-US" smtClean="0"/>
               <a:pPr/>
-              <a:t>9/6/2013</a:t>
+              <a:t>1/21/2015</a:t>
             </a:fld>
             <a:endParaRPr lang="en-US"/>
           </a:p>
@@ -800,7 +800,7 @@
             <a:fld id="{1D8BD707-D9CF-40AE-B4C6-C98DA3205C09}" type="datetimeFigureOut">
               <a:rPr lang="en-US" smtClean="0"/>
               <a:pPr/>
-              <a:t>9/6/2013</a:t>
+              <a:t>1/21/2015</a:t>
             </a:fld>
             <a:endParaRPr lang="en-US"/>
           </a:p>
@@ -1043,7 +1043,7 @@
             <a:fld id="{1D8BD707-D9CF-40AE-B4C6-C98DA3205C09}" type="datetimeFigureOut">
               <a:rPr lang="en-US" smtClean="0"/>
               <a:pPr/>
-              <a:t>9/6/2013</a:t>
+              <a:t>1/21/2015</a:t>
             </a:fld>
             <a:endParaRPr lang="en-US"/>
           </a:p>
@@ -1328,7 +1328,7 @@
             <a:fld id="{1D8BD707-D9CF-40AE-B4C6-C98DA3205C09}" type="datetimeFigureOut">
               <a:rPr lang="en-US" smtClean="0"/>
               <a:pPr/>
-              <a:t>9/6/2013</a:t>
+              <a:t>1/21/2015</a:t>
             </a:fld>
             <a:endParaRPr lang="en-US"/>
           </a:p>
@@ -1747,7 +1747,7 @@
             <a:fld id="{1D8BD707-D9CF-40AE-B4C6-C98DA3205C09}" type="datetimeFigureOut">
               <a:rPr lang="en-US" smtClean="0"/>
               <a:pPr/>
-              <a:t>9/6/2013</a:t>
+              <a:t>1/21/2015</a:t>
             </a:fld>
             <a:endParaRPr lang="en-US"/>
           </a:p>
@@ -1862,7 +1862,7 @@
             <a:fld id="{1D8BD707-D9CF-40AE-B4C6-C98DA3205C09}" type="datetimeFigureOut">
               <a:rPr lang="en-US" smtClean="0"/>
               <a:pPr/>
-              <a:t>9/6/2013</a:t>
+              <a:t>1/21/2015</a:t>
             </a:fld>
             <a:endParaRPr lang="en-US"/>
           </a:p>
@@ -1954,7 +1954,7 @@
             <a:fld id="{1D8BD707-D9CF-40AE-B4C6-C98DA3205C09}" type="datetimeFigureOut">
               <a:rPr lang="en-US" smtClean="0"/>
               <a:pPr/>
-              <a:t>9/6/2013</a:t>
+              <a:t>1/21/2015</a:t>
             </a:fld>
             <a:endParaRPr lang="en-US"/>
           </a:p>
@@ -2228,7 +2228,7 @@
             <a:fld id="{1D8BD707-D9CF-40AE-B4C6-C98DA3205C09}" type="datetimeFigureOut">
               <a:rPr lang="en-US" smtClean="0"/>
               <a:pPr/>
-              <a:t>9/6/2013</a:t>
+              <a:t>1/21/2015</a:t>
             </a:fld>
             <a:endParaRPr lang="en-US"/>
           </a:p>
@@ -2478,7 +2478,7 @@
             <a:fld id="{1D8BD707-D9CF-40AE-B4C6-C98DA3205C09}" type="datetimeFigureOut">
               <a:rPr lang="en-US" smtClean="0"/>
               <a:pPr/>
-              <a:t>9/6/2013</a:t>
+              <a:t>1/21/2015</a:t>
             </a:fld>
             <a:endParaRPr lang="en-US"/>
           </a:p>
@@ -2688,7 +2688,7 @@
             <a:fld id="{1D8BD707-D9CF-40AE-B4C6-C98DA3205C09}" type="datetimeFigureOut">
               <a:rPr lang="en-US" smtClean="0"/>
               <a:pPr/>
-              <a:t>9/6/2013</a:t>
+              <a:t>1/21/2015</a:t>
             </a:fld>
             <a:endParaRPr lang="en-US"/>
           </a:p>
@@ -3219,18 +3219,7 @@
                 <a:ea typeface="ＭＳ Ｐゴシック" charset="-128"/>
                 <a:cs typeface="Calibri" pitchFamily="34" charset="0"/>
               </a:rPr>
-              <a:t>eal </a:t>
-            </a:r>
-            <a:r>
-              <a:rPr lang="en-US" sz="2000" b="1" dirty="0" smtClean="0">
-                <a:solidFill>
-                  <a:srgbClr val="3B3B3B"/>
-                </a:solidFill>
-                <a:latin typeface="Calibri" pitchFamily="34" charset="0"/>
-                <a:ea typeface="ＭＳ Ｐゴシック" charset="-128"/>
-                <a:cs typeface="Calibri" pitchFamily="34" charset="0"/>
-              </a:rPr>
-              <a:t>world object or process</a:t>
+              <a:t>eal world object or process</a:t>
             </a:r>
             <a:endParaRPr lang="en-US" sz="2000" b="1" dirty="0">
               <a:solidFill>
@@ -3443,18 +3432,7 @@
                 <a:ea typeface="ＭＳ Ｐゴシック" charset="-128"/>
                 <a:cs typeface="Calibri" pitchFamily="34" charset="0"/>
               </a:rPr>
-              <a:t>xecutable </a:t>
-            </a:r>
-            <a:r>
-              <a:rPr lang="en-US" sz="2000" dirty="0" smtClean="0">
-                <a:solidFill>
-                  <a:schemeClr val="bg1"/>
-                </a:solidFill>
-                <a:latin typeface="Calibri" pitchFamily="34" charset="0"/>
-                <a:ea typeface="ＭＳ Ｐゴシック" charset="-128"/>
-                <a:cs typeface="Calibri" pitchFamily="34" charset="0"/>
-              </a:rPr>
-              <a:t>model</a:t>
+              <a:t>xecutable model</a:t>
             </a:r>
             <a:endParaRPr lang="en-US" sz="2000" dirty="0">
               <a:solidFill>
@@ -3614,18 +3592,7 @@
                 <a:ea typeface="ＭＳ Ｐゴシック" charset="-128"/>
                 <a:cs typeface="Calibri" pitchFamily="34" charset="0"/>
               </a:rPr>
-              <a:t>onceptual </a:t>
-            </a:r>
-            <a:r>
-              <a:rPr lang="en-US" sz="2000" dirty="0" smtClean="0">
-                <a:solidFill>
-                  <a:schemeClr val="bg1"/>
-                </a:solidFill>
-                <a:latin typeface="Calibri" pitchFamily="34" charset="0"/>
-                <a:ea typeface="ＭＳ Ｐゴシック" charset="-128"/>
-                <a:cs typeface="Calibri" pitchFamily="34" charset="0"/>
-              </a:rPr>
-              <a:t>model</a:t>
+              <a:t>onceptual model</a:t>
             </a:r>
             <a:endParaRPr lang="en-US" sz="2000" dirty="0">
               <a:solidFill>
@@ -3895,8 +3862,8 @@
         </p:nvSpPr>
         <p:spPr bwMode="auto">
           <a:xfrm>
-            <a:off x="2679482" y="4274823"/>
-            <a:ext cx="1914435" cy="1015663"/>
+            <a:off x="2677078" y="4547036"/>
+            <a:ext cx="1919243" cy="400110"/>
           </a:xfrm>
           <a:prstGeom prst="rect">
             <a:avLst/>
@@ -4008,23 +3975,6 @@
               <a:rPr lang="de-CH" sz="2000" dirty="0" smtClean="0"/>
               <a:t>mplementation </a:t>
             </a:r>
-            <a:endParaRPr lang="de-CH" sz="2000" dirty="0" smtClean="0"/>
-          </a:p>
-          <a:p>
-            <a:pPr algn="ctr"/>
-            <a:r>
-              <a:rPr lang="de-CH" sz="2000" dirty="0" smtClean="0"/>
-              <a:t>&amp;</a:t>
-            </a:r>
-            <a:endParaRPr lang="de-CH" sz="2000" dirty="0"/>
-          </a:p>
-          <a:p>
-            <a:pPr algn="ctr"/>
-            <a:r>
-              <a:rPr lang="de-CH" sz="2000" dirty="0" err="1"/>
-              <a:t>calibration</a:t>
-            </a:r>
-            <a:endParaRPr lang="de-CH" sz="2000" dirty="0"/>
           </a:p>
         </p:txBody>
       </p:sp>
@@ -4223,8 +4173,8 @@
               </a:schemeClr>
             </a:solidFill>
             <a:prstDash val="dash"/>
-            <a:headEnd type="arrow"/>
-            <a:tailEnd type="arrow"/>
+            <a:headEnd type="none"/>
+            <a:tailEnd type="none"/>
           </a:ln>
         </p:spPr>
         <p:style>
@@ -4252,8 +4202,8 @@
         </p:nvSpPr>
         <p:spPr bwMode="auto">
           <a:xfrm>
-            <a:off x="76199" y="4532644"/>
-            <a:ext cx="1229183" cy="400110"/>
+            <a:off x="0" y="4563716"/>
+            <a:ext cx="1611339" cy="1323439"/>
           </a:xfrm>
           <a:prstGeom prst="rect">
             <a:avLst/>
@@ -4384,16 +4334,40 @@
               <a:defRPr/>
             </a:pPr>
             <a:r>
-              <a:rPr lang="de-CH" sz="2000" dirty="0">
-                <a:latin typeface="+mj-lt"/>
-              </a:rPr>
-              <a:t>V</a:t>
-            </a:r>
-            <a:r>
               <a:rPr lang="de-CH" sz="2000" dirty="0" smtClean="0">
                 <a:latin typeface="+mj-lt"/>
               </a:rPr>
-              <a:t>alidation</a:t>
+              <a:t>Validation</a:t>
+            </a:r>
+          </a:p>
+          <a:p>
+            <a:pPr eaLnBrk="1" hangingPunct="1">
+              <a:defRPr/>
+            </a:pPr>
+            <a:endParaRPr lang="de-CH" sz="2000" dirty="0">
+              <a:latin typeface="+mj-lt"/>
+            </a:endParaRPr>
+          </a:p>
+          <a:p>
+            <a:pPr eaLnBrk="1" hangingPunct="1">
+              <a:defRPr/>
+            </a:pPr>
+            <a:r>
+              <a:rPr lang="de-CH" sz="2000" dirty="0" smtClean="0">
+                <a:latin typeface="+mj-lt"/>
+              </a:rPr>
+              <a:t>(and possibly </a:t>
+            </a:r>
+          </a:p>
+          <a:p>
+            <a:pPr eaLnBrk="1" hangingPunct="1">
+              <a:defRPr/>
+            </a:pPr>
+            <a:r>
+              <a:rPr lang="de-CH" sz="2000" dirty="0" smtClean="0">
+                <a:latin typeface="+mj-lt"/>
+              </a:rPr>
+              <a:t>Calibration) </a:t>
             </a:r>
             <a:endParaRPr lang="de-CH" sz="2000" dirty="0" smtClean="0">
               <a:latin typeface="+mj-lt"/>
@@ -4428,8 +4402,8 @@
               </a:schemeClr>
             </a:solidFill>
             <a:prstDash val="dash"/>
-            <a:headEnd type="arrow"/>
-            <a:tailEnd type="arrow"/>
+            <a:headEnd type="none"/>
+            <a:tailEnd type="none"/>
           </a:ln>
         </p:spPr>
         <p:style>
@@ -4951,8 +4925,149 @@
               </a:rPr>
               <a:t>»</a:t>
             </a:r>
-            <a:endParaRPr lang="de-CH" sz="2000" i="1" dirty="0" smtClean="0">
-              <a:latin typeface="+mj-lt"/>
+          </a:p>
+        </p:txBody>
+      </p:sp>
+      <p:sp>
+        <p:nvSpPr>
+          <p:cNvPr id="25" name="TextBox 69"/>
+          <p:cNvSpPr txBox="1">
+            <a:spLocks noChangeArrowheads="1"/>
+          </p:cNvSpPr>
+          <p:nvPr/>
+        </p:nvSpPr>
+        <p:spPr bwMode="auto">
+          <a:xfrm>
+            <a:off x="375774" y="4054002"/>
+            <a:ext cx="1539204" cy="400110"/>
+          </a:xfrm>
+          <a:prstGeom prst="rect">
+            <a:avLst/>
+          </a:prstGeom>
+          <a:solidFill>
+            <a:schemeClr val="bg1">
+              <a:alpha val="52000"/>
+            </a:schemeClr>
+          </a:solidFill>
+          <a:ln>
+            <a:noFill/>
+          </a:ln>
+          <a:extLst/>
+        </p:spPr>
+        <p:txBody>
+          <a:bodyPr wrap="none">
+            <a:spAutoFit/>
+          </a:bodyPr>
+          <a:lstStyle>
+            <a:defPPr>
+              <a:defRPr lang="en-US"/>
+            </a:defPPr>
+            <a:lvl1pPr>
+              <a:defRPr sz="1600">
+                <a:latin typeface="+mj-lt"/>
+                <a:ea typeface="ＭＳ Ｐゴシック" pitchFamily="34" charset="-128"/>
+              </a:defRPr>
+            </a:lvl1pPr>
+            <a:lvl2pPr marL="742950" indent="-285750" eaLnBrk="0" hangingPunct="0">
+              <a:defRPr>
+                <a:latin typeface="Arial" charset="0"/>
+                <a:ea typeface="ＭＳ Ｐゴシック" pitchFamily="34" charset="-128"/>
+              </a:defRPr>
+            </a:lvl2pPr>
+            <a:lvl3pPr marL="1143000" indent="-228600" eaLnBrk="0" hangingPunct="0">
+              <a:defRPr>
+                <a:latin typeface="Arial" charset="0"/>
+                <a:ea typeface="ＭＳ Ｐゴシック" pitchFamily="34" charset="-128"/>
+              </a:defRPr>
+            </a:lvl3pPr>
+            <a:lvl4pPr marL="1600200" indent="-228600" eaLnBrk="0" hangingPunct="0">
+              <a:defRPr>
+                <a:latin typeface="Arial" charset="0"/>
+                <a:ea typeface="ＭＳ Ｐゴシック" pitchFamily="34" charset="-128"/>
+              </a:defRPr>
+            </a:lvl4pPr>
+            <a:lvl5pPr marL="2057400" indent="-228600" eaLnBrk="0" hangingPunct="0">
+              <a:defRPr>
+                <a:latin typeface="Arial" charset="0"/>
+                <a:ea typeface="ＭＳ Ｐゴシック" pitchFamily="34" charset="-128"/>
+              </a:defRPr>
+            </a:lvl5pPr>
+            <a:lvl6pPr marL="2514600" indent="-228600" defTabSz="457200" eaLnBrk="0" fontAlgn="base" hangingPunct="0">
+              <a:spcBef>
+                <a:spcPct val="0"/>
+              </a:spcBef>
+              <a:spcAft>
+                <a:spcPct val="0"/>
+              </a:spcAft>
+              <a:defRPr>
+                <a:latin typeface="Arial" charset="0"/>
+                <a:ea typeface="ＭＳ Ｐゴシック" pitchFamily="34" charset="-128"/>
+              </a:defRPr>
+            </a:lvl6pPr>
+            <a:lvl7pPr marL="2971800" indent="-228600" defTabSz="457200" eaLnBrk="0" fontAlgn="base" hangingPunct="0">
+              <a:spcBef>
+                <a:spcPct val="0"/>
+              </a:spcBef>
+              <a:spcAft>
+                <a:spcPct val="0"/>
+              </a:spcAft>
+              <a:defRPr>
+                <a:latin typeface="Arial" charset="0"/>
+                <a:ea typeface="ＭＳ Ｐゴシック" pitchFamily="34" charset="-128"/>
+              </a:defRPr>
+            </a:lvl7pPr>
+            <a:lvl8pPr marL="3429000" indent="-228600" defTabSz="457200" eaLnBrk="0" fontAlgn="base" hangingPunct="0">
+              <a:spcBef>
+                <a:spcPct val="0"/>
+              </a:spcBef>
+              <a:spcAft>
+                <a:spcPct val="0"/>
+              </a:spcAft>
+              <a:defRPr>
+                <a:latin typeface="Arial" charset="0"/>
+                <a:ea typeface="ＭＳ Ｐゴシック" pitchFamily="34" charset="-128"/>
+              </a:defRPr>
+            </a:lvl8pPr>
+            <a:lvl9pPr marL="3886200" indent="-228600" defTabSz="457200" eaLnBrk="0" fontAlgn="base" hangingPunct="0">
+              <a:spcBef>
+                <a:spcPct val="0"/>
+              </a:spcBef>
+              <a:spcAft>
+                <a:spcPct val="0"/>
+              </a:spcAft>
+              <a:defRPr>
+                <a:latin typeface="Arial" charset="0"/>
+                <a:ea typeface="ＭＳ Ｐゴシック" pitchFamily="34" charset="-128"/>
+              </a:defRPr>
+            </a:lvl9pPr>
+          </a:lstStyle>
+          <a:p>
+            <a:r>
+              <a:rPr lang="de-CH" sz="2000" dirty="0" smtClean="0">
+                <a:solidFill>
+                  <a:schemeClr val="bg1">
+                    <a:lumMod val="65000"/>
+                  </a:schemeClr>
+                </a:solidFill>
+              </a:rPr>
+              <a:t>C</a:t>
+            </a:r>
+            <a:r>
+              <a:rPr lang="de-CH" sz="2000" dirty="0" smtClean="0">
+                <a:solidFill>
+                  <a:schemeClr val="bg1">
+                    <a:lumMod val="65000"/>
+                  </a:schemeClr>
+                </a:solidFill>
+              </a:rPr>
+              <a:t>omparisons</a:t>
+            </a:r>
+            <a:endParaRPr lang="de-CH" sz="2000" dirty="0">
+              <a:solidFill>
+                <a:schemeClr val="bg1">
+                  <a:lumMod val="65000"/>
+                </a:schemeClr>
+              </a:solidFill>
             </a:endParaRPr>
           </a:p>
         </p:txBody>

</xml_diff>